<commit_message>
Updated slides and improved startup
</commit_message>
<xml_diff>
--- a/CollectionsAndStreams.pptx
+++ b/CollectionsAndStreams.pptx
@@ -260,7 +260,7 @@
           <a:bodyPr lIns="0" rIns="0" tIns="0" bIns="0" anchor="b"/>
           <a:p>
             <a:pPr algn="r"/>
-            <a:fld id="{D7CFF282-DBC7-4956-886F-CE5DF857B9C8}" type="slidenum">
+            <a:fld id="{840F41ED-63A7-406E-9D65-E71DEE569991}" type="slidenum">
               <a:rPr b="0" lang="en-US" sz="1400" spc="-1" strike="noStrike">
                 <a:solidFill>
                   <a:srgbClr val="000000"/>
@@ -345,7 +345,7 @@
                 </a:uFill>
                 <a:latin typeface="Arial"/>
               </a:rPr>
-              <a:t>A stream is a way to operations over a List or some other type of collection which implements the Stream interface</a:t>
+              <a:t>A stream is a way to perform operations over a List or some other type of collection which implements the Stream interface</a:t>
             </a:r>
             <a:endParaRPr b="0" lang="en-US" sz="2000" spc="-1" strike="noStrike">
               <a:solidFill>
@@ -2830,7 +2830,7 @@
           <a:bodyPr lIns="0" rIns="0" tIns="0" bIns="0"/>
           <a:p>
             <a:pPr algn="r"/>
-            <a:fld id="{A0F27A43-00CC-42F0-833D-A12E91978F1F}" type="slidenum">
+            <a:fld id="{AE85EFE5-AB07-4495-B9A3-668A98221CB1}" type="slidenum">
               <a:rPr b="0" lang="en-US" sz="1400" spc="-1" strike="noStrike">
                 <a:solidFill>
                   <a:srgbClr val="000000"/>
@@ -4697,6 +4697,33 @@
       </p:sp>
     </p:spTree>
   </p:cSld>
+  <p:timing>
+    <p:tnLst>
+      <p:par>
+        <p:cTn id="9" dur="indefinite" restart="never" nodeType="tmRoot">
+          <p:childTnLst>
+            <p:seq>
+              <p:cTn id="10" nodeType="mainSeq"/>
+              <p:prevCondLst>
+                <p:cond delay="0" evt="onPrev">
+                  <p:tgtEl>
+                    <p:sldTgt/>
+                  </p:tgtEl>
+                </p:cond>
+              </p:prevCondLst>
+              <p:nextCondLst>
+                <p:cond delay="0" evt="onNext">
+                  <p:tgtEl>
+                    <p:sldTgt/>
+                  </p:tgtEl>
+                </p:cond>
+              </p:nextCondLst>
+            </p:seq>
+          </p:childTnLst>
+        </p:cTn>
+      </p:par>
+    </p:tnLst>
+  </p:timing>
 </p:sld>
 </file>
 

</xml_diff>